<commit_message>
changes to yaml and app.py for azure
</commit_message>
<xml_diff>
--- a/The Great Resignation.pptx
+++ b/The Great Resignation.pptx
@@ -29440,21 +29440,21 @@
                 <a:ea typeface="+mn-ea"/>
                 <a:cs typeface="+mn-cs"/>
               </a:rPr>
-              <a:t>This dashboard contains charts to visualize BLS data that will allows us to better understand labor trends caused by major events such as the Covid-19 </a:t>
-            </a:r>
-            <a:r>
-              <a:rPr lang="en-US" sz="2400" dirty="0" err="1">
+              <a:t>This dashboard contains charts to visualize BLS data that </a:t>
+            </a:r>
+            <a:r>
+              <a:rPr lang="en-US" sz="2400">
                 <a:ea typeface="+mn-ea"/>
                 <a:cs typeface="+mn-cs"/>
               </a:rPr>
-              <a:t>pendemic</a:t>
+              <a:t>will allow </a:t>
             </a:r>
             <a:r>
               <a:rPr lang="en-US" sz="2400" dirty="0">
                 <a:ea typeface="+mn-ea"/>
                 <a:cs typeface="+mn-cs"/>
               </a:rPr>
-              <a:t> and the 2008 recession. </a:t>
+              <a:t>us to better understand labor trends caused by major events such as the Covid-19 pandemic and the 2008 recession. </a:t>
             </a:r>
           </a:p>
         </p:txBody>

</xml_diff>